<commit_message>
Added specific objectives to presentation
</commit_message>
<xml_diff>
--- a/Presentation_Of_End_To_End_Survey_Of_BSDS_Students.pptx
+++ b/Presentation_Of_End_To_End_Survey_Of_BSDS_Students.pptx
@@ -5,19 +5,20 @@
     <p:sldMasterId id="2147483648" r:id="rId1"/>
   </p:sldMasterIdLst>
   <p:notesMasterIdLst>
-    <p:notesMasterId r:id="rId12"/>
+    <p:notesMasterId r:id="rId13"/>
   </p:notesMasterIdLst>
   <p:sldIdLst>
     <p:sldId id="262" r:id="rId2"/>
     <p:sldId id="301" r:id="rId3"/>
     <p:sldId id="302" r:id="rId4"/>
-    <p:sldId id="303" r:id="rId5"/>
-    <p:sldId id="298" r:id="rId6"/>
-    <p:sldId id="299" r:id="rId7"/>
-    <p:sldId id="300" r:id="rId8"/>
-    <p:sldId id="304" r:id="rId9"/>
-    <p:sldId id="306" r:id="rId10"/>
-    <p:sldId id="307" r:id="rId11"/>
+    <p:sldId id="308" r:id="rId5"/>
+    <p:sldId id="303" r:id="rId6"/>
+    <p:sldId id="298" r:id="rId7"/>
+    <p:sldId id="299" r:id="rId8"/>
+    <p:sldId id="300" r:id="rId9"/>
+    <p:sldId id="304" r:id="rId10"/>
+    <p:sldId id="306" r:id="rId11"/>
+    <p:sldId id="307" r:id="rId12"/>
   </p:sldIdLst>
   <p:sldSz cx="12192000" cy="6858000"/>
   <p:notesSz cx="7315200" cy="9601200"/>
@@ -218,7 +219,7 @@
           <a:p>
             <a:fld id="{09A8F5D6-AF3A-4847-9A07-E52DA9F035A8}" type="datetimeFigureOut">
               <a:rPr lang="en-US" smtClean="0"/>
-              <a:t>7/12/2024</a:t>
+              <a:t>7/13/2024</a:t>
             </a:fld>
             <a:endParaRPr lang="en-US"/>
           </a:p>
@@ -632,7 +633,7 @@
           <a:p>
             <a:fld id="{724478B9-A8CF-43AB-A8E3-1804CA51C4AD}" type="datetimeFigureOut">
               <a:rPr lang="en-US" smtClean="0"/>
-              <a:t>7/12/2024</a:t>
+              <a:t>7/13/2024</a:t>
             </a:fld>
             <a:endParaRPr lang="en-US"/>
           </a:p>
@@ -830,7 +831,7 @@
           <a:p>
             <a:fld id="{724478B9-A8CF-43AB-A8E3-1804CA51C4AD}" type="datetimeFigureOut">
               <a:rPr lang="en-US" smtClean="0"/>
-              <a:t>7/12/2024</a:t>
+              <a:t>7/13/2024</a:t>
             </a:fld>
             <a:endParaRPr lang="en-US"/>
           </a:p>
@@ -1038,7 +1039,7 @@
           <a:p>
             <a:fld id="{724478B9-A8CF-43AB-A8E3-1804CA51C4AD}" type="datetimeFigureOut">
               <a:rPr lang="en-US" smtClean="0"/>
-              <a:t>7/12/2024</a:t>
+              <a:t>7/13/2024</a:t>
             </a:fld>
             <a:endParaRPr lang="en-US"/>
           </a:p>
@@ -1236,7 +1237,7 @@
           <a:p>
             <a:fld id="{724478B9-A8CF-43AB-A8E3-1804CA51C4AD}" type="datetimeFigureOut">
               <a:rPr lang="en-US" smtClean="0"/>
-              <a:t>7/12/2024</a:t>
+              <a:t>7/13/2024</a:t>
             </a:fld>
             <a:endParaRPr lang="en-US"/>
           </a:p>
@@ -1511,7 +1512,7 @@
           <a:p>
             <a:fld id="{724478B9-A8CF-43AB-A8E3-1804CA51C4AD}" type="datetimeFigureOut">
               <a:rPr lang="en-US" smtClean="0"/>
-              <a:t>7/12/2024</a:t>
+              <a:t>7/13/2024</a:t>
             </a:fld>
             <a:endParaRPr lang="en-US"/>
           </a:p>
@@ -1776,7 +1777,7 @@
           <a:p>
             <a:fld id="{724478B9-A8CF-43AB-A8E3-1804CA51C4AD}" type="datetimeFigureOut">
               <a:rPr lang="en-US" smtClean="0"/>
-              <a:t>7/12/2024</a:t>
+              <a:t>7/13/2024</a:t>
             </a:fld>
             <a:endParaRPr lang="en-US"/>
           </a:p>
@@ -2188,7 +2189,7 @@
           <a:p>
             <a:fld id="{724478B9-A8CF-43AB-A8E3-1804CA51C4AD}" type="datetimeFigureOut">
               <a:rPr lang="en-US" smtClean="0"/>
-              <a:t>7/12/2024</a:t>
+              <a:t>7/13/2024</a:t>
             </a:fld>
             <a:endParaRPr lang="en-US"/>
           </a:p>
@@ -2329,7 +2330,7 @@
           <a:p>
             <a:fld id="{724478B9-A8CF-43AB-A8E3-1804CA51C4AD}" type="datetimeFigureOut">
               <a:rPr lang="en-US" smtClean="0"/>
-              <a:t>7/12/2024</a:t>
+              <a:t>7/13/2024</a:t>
             </a:fld>
             <a:endParaRPr lang="en-US"/>
           </a:p>
@@ -2442,7 +2443,7 @@
           <a:p>
             <a:fld id="{724478B9-A8CF-43AB-A8E3-1804CA51C4AD}" type="datetimeFigureOut">
               <a:rPr lang="en-US" smtClean="0"/>
-              <a:t>7/12/2024</a:t>
+              <a:t>7/13/2024</a:t>
             </a:fld>
             <a:endParaRPr lang="en-US"/>
           </a:p>
@@ -2753,7 +2754,7 @@
           <a:p>
             <a:fld id="{724478B9-A8CF-43AB-A8E3-1804CA51C4AD}" type="datetimeFigureOut">
               <a:rPr lang="en-US" smtClean="0"/>
-              <a:t>7/12/2024</a:t>
+              <a:t>7/13/2024</a:t>
             </a:fld>
             <a:endParaRPr lang="en-US"/>
           </a:p>
@@ -3041,7 +3042,7 @@
           <a:p>
             <a:fld id="{724478B9-A8CF-43AB-A8E3-1804CA51C4AD}" type="datetimeFigureOut">
               <a:rPr lang="en-US" smtClean="0"/>
-              <a:t>7/12/2024</a:t>
+              <a:t>7/13/2024</a:t>
             </a:fld>
             <a:endParaRPr lang="en-US"/>
           </a:p>
@@ -3282,7 +3283,7 @@
           <a:p>
             <a:fld id="{724478B9-A8CF-43AB-A8E3-1804CA51C4AD}" type="datetimeFigureOut">
               <a:rPr lang="en-US" smtClean="0"/>
-              <a:t>7/12/2024</a:t>
+              <a:t>7/13/2024</a:t>
             </a:fld>
             <a:endParaRPr lang="en-US"/>
           </a:p>
@@ -3886,6 +3887,131 @@
           <a:p>
             <a:r>
               <a:rPr lang="en-US" sz="3600" dirty="0"/>
+              <a:t>Data Collection</a:t>
+            </a:r>
+          </a:p>
+        </p:txBody>
+      </p:sp>
+      <p:pic>
+        <p:nvPicPr>
+          <p:cNvPr id="9" name="Picture 8">
+            <a:extLst>
+              <a:ext uri="{FF2B5EF4-FFF2-40B4-BE49-F238E27FC236}">
+                <a16:creationId xmlns:a16="http://schemas.microsoft.com/office/drawing/2014/main" id="{ADAF029F-2941-0FC2-988C-BD2A2E529093}"/>
+              </a:ext>
+            </a:extLst>
+          </p:cNvPr>
+          <p:cNvPicPr>
+            <a:picLocks noChangeAspect="1"/>
+          </p:cNvPicPr>
+          <p:nvPr/>
+        </p:nvPicPr>
+        <p:blipFill>
+          <a:blip r:embed="rId3"/>
+          <a:stretch>
+            <a:fillRect/>
+          </a:stretch>
+        </p:blipFill>
+        <p:spPr>
+          <a:xfrm>
+            <a:off x="3220576" y="1819917"/>
+            <a:ext cx="5750847" cy="5038083"/>
+          </a:xfrm>
+          <a:prstGeom prst="rect">
+            <a:avLst/>
+          </a:prstGeom>
+        </p:spPr>
+      </p:pic>
+    </p:spTree>
+    <p:extLst>
+      <p:ext uri="{BB962C8B-B14F-4D97-AF65-F5344CB8AC3E}">
+        <p14:creationId xmlns:p14="http://schemas.microsoft.com/office/powerpoint/2010/main" val="2908979853"/>
+      </p:ext>
+    </p:extLst>
+  </p:cSld>
+  <p:clrMapOvr>
+    <a:masterClrMapping/>
+  </p:clrMapOvr>
+</p:sld>
+</file>
+
+<file path=ppt/slides/slide11.xml><?xml version="1.0" encoding="utf-8"?>
+<p:sld xmlns:a="http://schemas.openxmlformats.org/drawingml/2006/main" xmlns:r="http://schemas.openxmlformats.org/officeDocument/2006/relationships" xmlns:p="http://schemas.openxmlformats.org/presentationml/2006/main">
+  <p:cSld>
+    <p:spTree>
+      <p:nvGrpSpPr>
+        <p:cNvPr id="1" name=""/>
+        <p:cNvGrpSpPr/>
+        <p:nvPr/>
+      </p:nvGrpSpPr>
+      <p:grpSpPr>
+        <a:xfrm>
+          <a:off x="0" y="0"/>
+          <a:ext cx="0" cy="0"/>
+          <a:chOff x="0" y="0"/>
+          <a:chExt cx="0" cy="0"/>
+        </a:xfrm>
+      </p:grpSpPr>
+      <p:pic>
+        <p:nvPicPr>
+          <p:cNvPr id="5" name="Picture 4">
+            <a:extLst>
+              <a:ext uri="{FF2B5EF4-FFF2-40B4-BE49-F238E27FC236}">
+                <a16:creationId xmlns:a16="http://schemas.microsoft.com/office/drawing/2014/main" id="{F37E0954-C93D-4E4E-89C3-A7C02A566B8C}"/>
+              </a:ext>
+            </a:extLst>
+          </p:cNvPr>
+          <p:cNvPicPr>
+            <a:picLocks noChangeAspect="1"/>
+          </p:cNvPicPr>
+          <p:nvPr/>
+        </p:nvPicPr>
+        <p:blipFill>
+          <a:blip r:embed="rId2"/>
+          <a:stretch>
+            <a:fillRect/>
+          </a:stretch>
+        </p:blipFill>
+        <p:spPr>
+          <a:xfrm>
+            <a:off x="0" y="-1"/>
+            <a:ext cx="12192000" cy="1819917"/>
+          </a:xfrm>
+          <a:prstGeom prst="rect">
+            <a:avLst/>
+          </a:prstGeom>
+        </p:spPr>
+      </p:pic>
+      <p:sp>
+        <p:nvSpPr>
+          <p:cNvPr id="2" name="Title 1">
+            <a:extLst>
+              <a:ext uri="{FF2B5EF4-FFF2-40B4-BE49-F238E27FC236}">
+                <a16:creationId xmlns:a16="http://schemas.microsoft.com/office/drawing/2014/main" id="{027EE828-B2F2-4E7F-A4C7-BEDBF0D9EED9}"/>
+              </a:ext>
+            </a:extLst>
+          </p:cNvPr>
+          <p:cNvSpPr>
+            <a:spLocks noGrp="1"/>
+          </p:cNvSpPr>
+          <p:nvPr>
+            <p:ph type="title"/>
+          </p:nvPr>
+        </p:nvSpPr>
+        <p:spPr>
+          <a:xfrm>
+            <a:off x="838200" y="353094"/>
+            <a:ext cx="10515600" cy="1325563"/>
+          </a:xfrm>
+        </p:spPr>
+        <p:txBody>
+          <a:bodyPr>
+            <a:normAutofit/>
+          </a:bodyPr>
+          <a:lstStyle/>
+          <a:p>
+            <a:r>
+              <a:rPr lang="en-US" sz="3600" dirty="0"/>
               <a:t>Feature Matrix</a:t>
             </a:r>
           </a:p>
@@ -4139,7 +4265,7 @@
           <a:p>
             <a:r>
               <a:rPr lang="en-US" sz="3600" dirty="0"/>
-              <a:t>Objectives</a:t>
+              <a:t>General Objectives</a:t>
             </a:r>
             <a:endParaRPr lang="en-US" sz="2800" dirty="0"/>
           </a:p>
@@ -4168,7 +4294,9 @@
           </a:xfrm>
         </p:spPr>
         <p:txBody>
-          <a:bodyPr/>
+          <a:bodyPr>
+            <a:normAutofit/>
+          </a:bodyPr>
           <a:lstStyle/>
           <a:p>
             <a:pPr marL="0" indent="0">
@@ -4302,7 +4430,7 @@
           <a:p>
             <a:r>
               <a:rPr lang="en-US" sz="3600" dirty="0"/>
-              <a:t>Collaborators</a:t>
+              <a:t>Specific Objectives</a:t>
             </a:r>
             <a:endParaRPr lang="en-US" sz="2800" dirty="0"/>
           </a:p>
@@ -4347,7 +4475,7 @@
             </a:pPr>
             <a:r>
               <a:rPr lang="en-US" dirty="0"/>
-              <a:t>you all</a:t>
+              <a:t>Create a binary classifier, multiclass classifier, or regression model that may predict whether a student found the BSDS program to be satisfying overall.</a:t>
             </a:r>
           </a:p>
           <a:p>
@@ -4362,22 +4490,7 @@
             </a:pPr>
             <a:r>
               <a:rPr lang="en-US" dirty="0"/>
-              <a:t>every faculty member, staff member, PhD student, MSDS student, and BSDS student who is willing to respond to an email requesting questions for a hypothetical questionnaire that meets objectives</a:t>
-            </a:r>
-          </a:p>
-          <a:p>
-            <a:pPr marL="0" indent="0">
-              <a:buNone/>
-            </a:pPr>
-            <a:endParaRPr lang="en-US" dirty="0"/>
-          </a:p>
-          <a:p>
-            <a:pPr marL="0" indent="0">
-              <a:buNone/>
-            </a:pPr>
-            <a:r>
-              <a:rPr lang="en-US" dirty="0"/>
-              <a:t>everyone listed in “Table of Collaborators”</a:t>
+              <a:t>Understand which predictors are most likely to determine whether a student found the BSDS program to be satisfying overall.</a:t>
             </a:r>
           </a:p>
         </p:txBody>
@@ -4385,7 +4498,7 @@
     </p:spTree>
     <p:extLst>
       <p:ext uri="{BB962C8B-B14F-4D97-AF65-F5344CB8AC3E}">
-        <p14:creationId xmlns:p14="http://schemas.microsoft.com/office/powerpoint/2010/main" val="1735536971"/>
+        <p14:creationId xmlns:p14="http://schemas.microsoft.com/office/powerpoint/2010/main" val="115046770"/>
       </p:ext>
     </p:extLst>
   </p:cSld>
@@ -4434,6 +4547,171 @@
         </p:blipFill>
         <p:spPr>
           <a:xfrm>
+            <a:off x="0" y="0"/>
+            <a:ext cx="12192000" cy="1819917"/>
+          </a:xfrm>
+          <a:prstGeom prst="rect">
+            <a:avLst/>
+          </a:prstGeom>
+        </p:spPr>
+      </p:pic>
+      <p:sp>
+        <p:nvSpPr>
+          <p:cNvPr id="2" name="Title 1">
+            <a:extLst>
+              <a:ext uri="{FF2B5EF4-FFF2-40B4-BE49-F238E27FC236}">
+                <a16:creationId xmlns:a16="http://schemas.microsoft.com/office/drawing/2014/main" id="{027EE828-B2F2-4E7F-A4C7-BEDBF0D9EED9}"/>
+              </a:ext>
+            </a:extLst>
+          </p:cNvPr>
+          <p:cNvSpPr>
+            <a:spLocks noGrp="1"/>
+          </p:cNvSpPr>
+          <p:nvPr>
+            <p:ph type="title"/>
+          </p:nvPr>
+        </p:nvSpPr>
+        <p:spPr/>
+        <p:txBody>
+          <a:bodyPr>
+            <a:normAutofit/>
+          </a:bodyPr>
+          <a:lstStyle/>
+          <a:p>
+            <a:r>
+              <a:rPr lang="en-US" sz="3600" dirty="0"/>
+              <a:t>Collaborators</a:t>
+            </a:r>
+            <a:endParaRPr lang="en-US" sz="2800" dirty="0"/>
+          </a:p>
+        </p:txBody>
+      </p:sp>
+      <p:sp>
+        <p:nvSpPr>
+          <p:cNvPr id="6" name="Content Placeholder 2">
+            <a:extLst>
+              <a:ext uri="{FF2B5EF4-FFF2-40B4-BE49-F238E27FC236}">
+                <a16:creationId xmlns:a16="http://schemas.microsoft.com/office/drawing/2014/main" id="{CF143FC4-8FB5-4B4A-BC87-767AD5802D79}"/>
+              </a:ext>
+            </a:extLst>
+          </p:cNvPr>
+          <p:cNvSpPr>
+            <a:spLocks noGrp="1"/>
+          </p:cNvSpPr>
+          <p:nvPr>
+            <p:ph idx="1"/>
+          </p:nvPr>
+        </p:nvSpPr>
+        <p:spPr>
+          <a:xfrm>
+            <a:off x="838200" y="1825625"/>
+            <a:ext cx="10515600" cy="4351338"/>
+          </a:xfrm>
+        </p:spPr>
+        <p:txBody>
+          <a:bodyPr>
+            <a:normAutofit/>
+          </a:bodyPr>
+          <a:lstStyle/>
+          <a:p>
+            <a:pPr marL="0" indent="0">
+              <a:buNone/>
+            </a:pPr>
+            <a:endParaRPr lang="en-US" dirty="0"/>
+          </a:p>
+          <a:p>
+            <a:pPr marL="0" indent="0">
+              <a:buNone/>
+            </a:pPr>
+            <a:r>
+              <a:rPr lang="en-US" dirty="0"/>
+              <a:t>you all</a:t>
+            </a:r>
+          </a:p>
+          <a:p>
+            <a:pPr marL="0" indent="0">
+              <a:buNone/>
+            </a:pPr>
+            <a:endParaRPr lang="en-US" dirty="0"/>
+          </a:p>
+          <a:p>
+            <a:pPr marL="0" indent="0">
+              <a:buNone/>
+            </a:pPr>
+            <a:r>
+              <a:rPr lang="en-US" dirty="0"/>
+              <a:t>every faculty member, staff member, PhD student, MSDS student, and BSDS student who is willing to respond to an email requesting questions for a hypothetical questionnaire that meets objectives</a:t>
+            </a:r>
+          </a:p>
+          <a:p>
+            <a:pPr marL="0" indent="0">
+              <a:buNone/>
+            </a:pPr>
+            <a:endParaRPr lang="en-US" dirty="0"/>
+          </a:p>
+          <a:p>
+            <a:pPr marL="0" indent="0">
+              <a:buNone/>
+            </a:pPr>
+            <a:r>
+              <a:rPr lang="en-US" dirty="0"/>
+              <a:t>everyone listed in “Table of Collaborators”</a:t>
+            </a:r>
+          </a:p>
+        </p:txBody>
+      </p:sp>
+    </p:spTree>
+    <p:extLst>
+      <p:ext uri="{BB962C8B-B14F-4D97-AF65-F5344CB8AC3E}">
+        <p14:creationId xmlns:p14="http://schemas.microsoft.com/office/powerpoint/2010/main" val="1735536971"/>
+      </p:ext>
+    </p:extLst>
+  </p:cSld>
+  <p:clrMapOvr>
+    <a:masterClrMapping/>
+  </p:clrMapOvr>
+</p:sld>
+</file>
+
+<file path=ppt/slides/slide6.xml><?xml version="1.0" encoding="utf-8"?>
+<p:sld xmlns:a="http://schemas.openxmlformats.org/drawingml/2006/main" xmlns:r="http://schemas.openxmlformats.org/officeDocument/2006/relationships" xmlns:p="http://schemas.openxmlformats.org/presentationml/2006/main">
+  <p:cSld>
+    <p:spTree>
+      <p:nvGrpSpPr>
+        <p:cNvPr id="1" name=""/>
+        <p:cNvGrpSpPr/>
+        <p:nvPr/>
+      </p:nvGrpSpPr>
+      <p:grpSpPr>
+        <a:xfrm>
+          <a:off x="0" y="0"/>
+          <a:ext cx="0" cy="0"/>
+          <a:chOff x="0" y="0"/>
+          <a:chExt cx="0" cy="0"/>
+        </a:xfrm>
+      </p:grpSpPr>
+      <p:pic>
+        <p:nvPicPr>
+          <p:cNvPr id="5" name="Picture 4">
+            <a:extLst>
+              <a:ext uri="{FF2B5EF4-FFF2-40B4-BE49-F238E27FC236}">
+                <a16:creationId xmlns:a16="http://schemas.microsoft.com/office/drawing/2014/main" id="{F37E0954-C93D-4E4E-89C3-A7C02A566B8C}"/>
+              </a:ext>
+            </a:extLst>
+          </p:cNvPr>
+          <p:cNvPicPr>
+            <a:picLocks noChangeAspect="1"/>
+          </p:cNvPicPr>
+          <p:nvPr/>
+        </p:nvPicPr>
+        <p:blipFill>
+          <a:blip r:embed="rId2"/>
+          <a:stretch>
+            <a:fillRect/>
+          </a:stretch>
+        </p:blipFill>
+        <p:spPr>
+          <a:xfrm>
             <a:off x="0" y="-1"/>
             <a:ext cx="12192000" cy="1819917"/>
           </a:xfrm>
@@ -4526,7 +4804,7 @@
 </p:sld>
 </file>
 
-<file path=ppt/slides/slide6.xml><?xml version="1.0" encoding="utf-8"?>
+<file path=ppt/slides/slide7.xml><?xml version="1.0" encoding="utf-8"?>
 <p:sld xmlns:a="http://schemas.openxmlformats.org/drawingml/2006/main" xmlns:r="http://schemas.openxmlformats.org/officeDocument/2006/relationships" xmlns:p="http://schemas.openxmlformats.org/presentationml/2006/main">
   <p:cSld>
     <p:spTree>
@@ -4681,7 +4959,7 @@
 </p:sld>
 </file>
 
-<file path=ppt/slides/slide7.xml><?xml version="1.0" encoding="utf-8"?>
+<file path=ppt/slides/slide8.xml><?xml version="1.0" encoding="utf-8"?>
 <p:sld xmlns:a="http://schemas.openxmlformats.org/drawingml/2006/main" xmlns:r="http://schemas.openxmlformats.org/officeDocument/2006/relationships" xmlns:p="http://schemas.openxmlformats.org/presentationml/2006/main">
   <p:cSld>
     <p:spTree>
@@ -4806,7 +5084,7 @@
 </p:sld>
 </file>
 
-<file path=ppt/slides/slide8.xml><?xml version="1.0" encoding="utf-8"?>
+<file path=ppt/slides/slide9.xml><?xml version="1.0" encoding="utf-8"?>
 <p:sld xmlns:a="http://schemas.openxmlformats.org/drawingml/2006/main" xmlns:r="http://schemas.openxmlformats.org/officeDocument/2006/relationships" xmlns:p="http://schemas.openxmlformats.org/presentationml/2006/main">
   <p:cSld>
     <p:spTree>
@@ -4928,131 +5206,6 @@
     <p:extLst>
       <p:ext uri="{BB962C8B-B14F-4D97-AF65-F5344CB8AC3E}">
         <p14:creationId xmlns:p14="http://schemas.microsoft.com/office/powerpoint/2010/main" val="26722856"/>
-      </p:ext>
-    </p:extLst>
-  </p:cSld>
-  <p:clrMapOvr>
-    <a:masterClrMapping/>
-  </p:clrMapOvr>
-</p:sld>
-</file>
-
-<file path=ppt/slides/slide9.xml><?xml version="1.0" encoding="utf-8"?>
-<p:sld xmlns:a="http://schemas.openxmlformats.org/drawingml/2006/main" xmlns:r="http://schemas.openxmlformats.org/officeDocument/2006/relationships" xmlns:p="http://schemas.openxmlformats.org/presentationml/2006/main">
-  <p:cSld>
-    <p:spTree>
-      <p:nvGrpSpPr>
-        <p:cNvPr id="1" name=""/>
-        <p:cNvGrpSpPr/>
-        <p:nvPr/>
-      </p:nvGrpSpPr>
-      <p:grpSpPr>
-        <a:xfrm>
-          <a:off x="0" y="0"/>
-          <a:ext cx="0" cy="0"/>
-          <a:chOff x="0" y="0"/>
-          <a:chExt cx="0" cy="0"/>
-        </a:xfrm>
-      </p:grpSpPr>
-      <p:pic>
-        <p:nvPicPr>
-          <p:cNvPr id="5" name="Picture 4">
-            <a:extLst>
-              <a:ext uri="{FF2B5EF4-FFF2-40B4-BE49-F238E27FC236}">
-                <a16:creationId xmlns:a16="http://schemas.microsoft.com/office/drawing/2014/main" id="{F37E0954-C93D-4E4E-89C3-A7C02A566B8C}"/>
-              </a:ext>
-            </a:extLst>
-          </p:cNvPr>
-          <p:cNvPicPr>
-            <a:picLocks noChangeAspect="1"/>
-          </p:cNvPicPr>
-          <p:nvPr/>
-        </p:nvPicPr>
-        <p:blipFill>
-          <a:blip r:embed="rId2"/>
-          <a:stretch>
-            <a:fillRect/>
-          </a:stretch>
-        </p:blipFill>
-        <p:spPr>
-          <a:xfrm>
-            <a:off x="0" y="-1"/>
-            <a:ext cx="12192000" cy="1819917"/>
-          </a:xfrm>
-          <a:prstGeom prst="rect">
-            <a:avLst/>
-          </a:prstGeom>
-        </p:spPr>
-      </p:pic>
-      <p:sp>
-        <p:nvSpPr>
-          <p:cNvPr id="2" name="Title 1">
-            <a:extLst>
-              <a:ext uri="{FF2B5EF4-FFF2-40B4-BE49-F238E27FC236}">
-                <a16:creationId xmlns:a16="http://schemas.microsoft.com/office/drawing/2014/main" id="{027EE828-B2F2-4E7F-A4C7-BEDBF0D9EED9}"/>
-              </a:ext>
-            </a:extLst>
-          </p:cNvPr>
-          <p:cNvSpPr>
-            <a:spLocks noGrp="1"/>
-          </p:cNvSpPr>
-          <p:nvPr>
-            <p:ph type="title"/>
-          </p:nvPr>
-        </p:nvSpPr>
-        <p:spPr>
-          <a:xfrm>
-            <a:off x="838200" y="353094"/>
-            <a:ext cx="10515600" cy="1325563"/>
-          </a:xfrm>
-        </p:spPr>
-        <p:txBody>
-          <a:bodyPr>
-            <a:normAutofit/>
-          </a:bodyPr>
-          <a:lstStyle/>
-          <a:p>
-            <a:r>
-              <a:rPr lang="en-US" sz="3600" dirty="0"/>
-              <a:t>Data Collection</a:t>
-            </a:r>
-          </a:p>
-        </p:txBody>
-      </p:sp>
-      <p:pic>
-        <p:nvPicPr>
-          <p:cNvPr id="9" name="Picture 8">
-            <a:extLst>
-              <a:ext uri="{FF2B5EF4-FFF2-40B4-BE49-F238E27FC236}">
-                <a16:creationId xmlns:a16="http://schemas.microsoft.com/office/drawing/2014/main" id="{ADAF029F-2941-0FC2-988C-BD2A2E529093}"/>
-              </a:ext>
-            </a:extLst>
-          </p:cNvPr>
-          <p:cNvPicPr>
-            <a:picLocks noChangeAspect="1"/>
-          </p:cNvPicPr>
-          <p:nvPr/>
-        </p:nvPicPr>
-        <p:blipFill>
-          <a:blip r:embed="rId3"/>
-          <a:stretch>
-            <a:fillRect/>
-          </a:stretch>
-        </p:blipFill>
-        <p:spPr>
-          <a:xfrm>
-            <a:off x="3220576" y="1819917"/>
-            <a:ext cx="5750847" cy="5038083"/>
-          </a:xfrm>
-          <a:prstGeom prst="rect">
-            <a:avLst/>
-          </a:prstGeom>
-        </p:spPr>
-      </p:pic>
-    </p:spTree>
-    <p:extLst>
-      <p:ext uri="{BB962C8B-B14F-4D97-AF65-F5344CB8AC3E}">
-        <p14:creationId xmlns:p14="http://schemas.microsoft.com/office/powerpoint/2010/main" val="2908979853"/>
       </p:ext>
     </p:extLst>
   </p:cSld>

</xml_diff>

<commit_message>
Completed presentation of end to end survey of BSDS students
</commit_message>
<xml_diff>
--- a/Presentation_Of_End_To_End_Survey_Of_BSDS_Students.pptx
+++ b/Presentation_Of_End_To_End_Survey_Of_BSDS_Students.pptx
@@ -5,7 +5,7 @@
     <p:sldMasterId id="2147483648" r:id="rId1"/>
   </p:sldMasterIdLst>
   <p:notesMasterIdLst>
-    <p:notesMasterId r:id="rId13"/>
+    <p:notesMasterId r:id="rId21"/>
   </p:notesMasterIdLst>
   <p:sldIdLst>
     <p:sldId id="262" r:id="rId2"/>
@@ -13,12 +13,20 @@
     <p:sldId id="302" r:id="rId4"/>
     <p:sldId id="308" r:id="rId5"/>
     <p:sldId id="303" r:id="rId6"/>
-    <p:sldId id="298" r:id="rId7"/>
-    <p:sldId id="299" r:id="rId8"/>
-    <p:sldId id="300" r:id="rId9"/>
-    <p:sldId id="304" r:id="rId10"/>
-    <p:sldId id="306" r:id="rId11"/>
-    <p:sldId id="307" r:id="rId12"/>
+    <p:sldId id="310" r:id="rId7"/>
+    <p:sldId id="298" r:id="rId8"/>
+    <p:sldId id="299" r:id="rId9"/>
+    <p:sldId id="300" r:id="rId10"/>
+    <p:sldId id="304" r:id="rId11"/>
+    <p:sldId id="306" r:id="rId12"/>
+    <p:sldId id="307" r:id="rId13"/>
+    <p:sldId id="309" r:id="rId14"/>
+    <p:sldId id="311" r:id="rId15"/>
+    <p:sldId id="312" r:id="rId16"/>
+    <p:sldId id="314" r:id="rId17"/>
+    <p:sldId id="315" r:id="rId18"/>
+    <p:sldId id="316" r:id="rId19"/>
+    <p:sldId id="317" r:id="rId20"/>
   </p:sldIdLst>
   <p:sldSz cx="12192000" cy="6858000"/>
   <p:notesSz cx="7315200" cy="9601200"/>
@@ -3887,7 +3895,7 @@
           <a:p>
             <a:r>
               <a:rPr lang="en-US" sz="3600" dirty="0"/>
-              <a:t>Data Collection</a:t>
+              <a:t>Deployment</a:t>
             </a:r>
           </a:p>
         </p:txBody>
@@ -3897,7 +3905,7 @@
           <p:cNvPr id="9" name="Picture 8">
             <a:extLst>
               <a:ext uri="{FF2B5EF4-FFF2-40B4-BE49-F238E27FC236}">
-                <a16:creationId xmlns:a16="http://schemas.microsoft.com/office/drawing/2014/main" id="{ADAF029F-2941-0FC2-988C-BD2A2E529093}"/>
+                <a16:creationId xmlns:a16="http://schemas.microsoft.com/office/drawing/2014/main" id="{EEE7FE14-330D-7531-3881-5B547EEB1928}"/>
               </a:ext>
             </a:extLst>
           </p:cNvPr>
@@ -3907,15 +3915,21 @@
           <p:nvPr/>
         </p:nvPicPr>
         <p:blipFill>
-          <a:blip r:embed="rId3"/>
+          <a:blip r:embed="rId3">
+            <a:extLst>
+              <a:ext uri="{28A0092B-C50C-407E-A947-70E740481C1C}">
+                <a14:useLocalDpi xmlns:a14="http://schemas.microsoft.com/office/drawing/2010/main" val="0"/>
+              </a:ext>
+            </a:extLst>
+          </a:blip>
           <a:stretch>
             <a:fillRect/>
           </a:stretch>
         </p:blipFill>
         <p:spPr>
           <a:xfrm>
-            <a:off x="3220576" y="1819917"/>
-            <a:ext cx="5750847" cy="5038083"/>
+            <a:off x="4152900" y="1819962"/>
+            <a:ext cx="3886200" cy="5038038"/>
           </a:xfrm>
           <a:prstGeom prst="rect">
             <a:avLst/>
@@ -3925,7 +3939,7 @@
     </p:spTree>
     <p:extLst>
       <p:ext uri="{BB962C8B-B14F-4D97-AF65-F5344CB8AC3E}">
-        <p14:creationId xmlns:p14="http://schemas.microsoft.com/office/powerpoint/2010/main" val="2908979853"/>
+        <p14:creationId xmlns:p14="http://schemas.microsoft.com/office/powerpoint/2010/main" val="26722856"/>
       </p:ext>
     </p:extLst>
   </p:cSld>
@@ -4012,17 +4026,17 @@
           <a:p>
             <a:r>
               <a:rPr lang="en-US" sz="3600" dirty="0"/>
-              <a:t>Feature Matrix</a:t>
+              <a:t>Data Collection</a:t>
             </a:r>
           </a:p>
         </p:txBody>
       </p:sp>
       <p:pic>
         <p:nvPicPr>
-          <p:cNvPr id="4" name="Picture 3">
-            <a:extLst>
-              <a:ext uri="{FF2B5EF4-FFF2-40B4-BE49-F238E27FC236}">
-                <a16:creationId xmlns:a16="http://schemas.microsoft.com/office/drawing/2014/main" id="{2901802B-2CE6-68D3-BDC8-B372F2ED2EFD}"/>
+          <p:cNvPr id="9" name="Picture 8">
+            <a:extLst>
+              <a:ext uri="{FF2B5EF4-FFF2-40B4-BE49-F238E27FC236}">
+                <a16:creationId xmlns:a16="http://schemas.microsoft.com/office/drawing/2014/main" id="{ADAF029F-2941-0FC2-988C-BD2A2E529093}"/>
               </a:ext>
             </a:extLst>
           </p:cNvPr>
@@ -4039,6 +4053,131 @@
         </p:blipFill>
         <p:spPr>
           <a:xfrm>
+            <a:off x="3220576" y="1819917"/>
+            <a:ext cx="5750847" cy="5038083"/>
+          </a:xfrm>
+          <a:prstGeom prst="rect">
+            <a:avLst/>
+          </a:prstGeom>
+        </p:spPr>
+      </p:pic>
+    </p:spTree>
+    <p:extLst>
+      <p:ext uri="{BB962C8B-B14F-4D97-AF65-F5344CB8AC3E}">
+        <p14:creationId xmlns:p14="http://schemas.microsoft.com/office/powerpoint/2010/main" val="2908979853"/>
+      </p:ext>
+    </p:extLst>
+  </p:cSld>
+  <p:clrMapOvr>
+    <a:masterClrMapping/>
+  </p:clrMapOvr>
+</p:sld>
+</file>
+
+<file path=ppt/slides/slide12.xml><?xml version="1.0" encoding="utf-8"?>
+<p:sld xmlns:a="http://schemas.openxmlformats.org/drawingml/2006/main" xmlns:r="http://schemas.openxmlformats.org/officeDocument/2006/relationships" xmlns:p="http://schemas.openxmlformats.org/presentationml/2006/main">
+  <p:cSld>
+    <p:spTree>
+      <p:nvGrpSpPr>
+        <p:cNvPr id="1" name=""/>
+        <p:cNvGrpSpPr/>
+        <p:nvPr/>
+      </p:nvGrpSpPr>
+      <p:grpSpPr>
+        <a:xfrm>
+          <a:off x="0" y="0"/>
+          <a:ext cx="0" cy="0"/>
+          <a:chOff x="0" y="0"/>
+          <a:chExt cx="0" cy="0"/>
+        </a:xfrm>
+      </p:grpSpPr>
+      <p:pic>
+        <p:nvPicPr>
+          <p:cNvPr id="5" name="Picture 4">
+            <a:extLst>
+              <a:ext uri="{FF2B5EF4-FFF2-40B4-BE49-F238E27FC236}">
+                <a16:creationId xmlns:a16="http://schemas.microsoft.com/office/drawing/2014/main" id="{F37E0954-C93D-4E4E-89C3-A7C02A566B8C}"/>
+              </a:ext>
+            </a:extLst>
+          </p:cNvPr>
+          <p:cNvPicPr>
+            <a:picLocks noChangeAspect="1"/>
+          </p:cNvPicPr>
+          <p:nvPr/>
+        </p:nvPicPr>
+        <p:blipFill>
+          <a:blip r:embed="rId2"/>
+          <a:stretch>
+            <a:fillRect/>
+          </a:stretch>
+        </p:blipFill>
+        <p:spPr>
+          <a:xfrm>
+            <a:off x="0" y="-1"/>
+            <a:ext cx="12192000" cy="1819917"/>
+          </a:xfrm>
+          <a:prstGeom prst="rect">
+            <a:avLst/>
+          </a:prstGeom>
+        </p:spPr>
+      </p:pic>
+      <p:sp>
+        <p:nvSpPr>
+          <p:cNvPr id="2" name="Title 1">
+            <a:extLst>
+              <a:ext uri="{FF2B5EF4-FFF2-40B4-BE49-F238E27FC236}">
+                <a16:creationId xmlns:a16="http://schemas.microsoft.com/office/drawing/2014/main" id="{027EE828-B2F2-4E7F-A4C7-BEDBF0D9EED9}"/>
+              </a:ext>
+            </a:extLst>
+          </p:cNvPr>
+          <p:cNvSpPr>
+            <a:spLocks noGrp="1"/>
+          </p:cNvSpPr>
+          <p:nvPr>
+            <p:ph type="title"/>
+          </p:nvPr>
+        </p:nvSpPr>
+        <p:spPr>
+          <a:xfrm>
+            <a:off x="838200" y="353094"/>
+            <a:ext cx="10515600" cy="1325563"/>
+          </a:xfrm>
+        </p:spPr>
+        <p:txBody>
+          <a:bodyPr>
+            <a:normAutofit/>
+          </a:bodyPr>
+          <a:lstStyle/>
+          <a:p>
+            <a:r>
+              <a:rPr lang="en-US" sz="3600" dirty="0"/>
+              <a:t>Feature Matrix</a:t>
+            </a:r>
+          </a:p>
+        </p:txBody>
+      </p:sp>
+      <p:pic>
+        <p:nvPicPr>
+          <p:cNvPr id="4" name="Picture 3">
+            <a:extLst>
+              <a:ext uri="{FF2B5EF4-FFF2-40B4-BE49-F238E27FC236}">
+                <a16:creationId xmlns:a16="http://schemas.microsoft.com/office/drawing/2014/main" id="{2901802B-2CE6-68D3-BDC8-B372F2ED2EFD}"/>
+              </a:ext>
+            </a:extLst>
+          </p:cNvPr>
+          <p:cNvPicPr>
+            <a:picLocks noChangeAspect="1"/>
+          </p:cNvPicPr>
+          <p:nvPr/>
+        </p:nvPicPr>
+        <p:blipFill>
+          <a:blip r:embed="rId3"/>
+          <a:stretch>
+            <a:fillRect/>
+          </a:stretch>
+        </p:blipFill>
+        <p:spPr>
+          <a:xfrm>
             <a:off x="476133" y="1819916"/>
             <a:ext cx="11239734" cy="5038084"/>
           </a:xfrm>
@@ -4051,6 +4190,1071 @@
     <p:extLst>
       <p:ext uri="{BB962C8B-B14F-4D97-AF65-F5344CB8AC3E}">
         <p14:creationId xmlns:p14="http://schemas.microsoft.com/office/powerpoint/2010/main" val="2735231481"/>
+      </p:ext>
+    </p:extLst>
+  </p:cSld>
+  <p:clrMapOvr>
+    <a:masterClrMapping/>
+  </p:clrMapOvr>
+</p:sld>
+</file>
+
+<file path=ppt/slides/slide13.xml><?xml version="1.0" encoding="utf-8"?>
+<p:sld xmlns:a="http://schemas.openxmlformats.org/drawingml/2006/main" xmlns:r="http://schemas.openxmlformats.org/officeDocument/2006/relationships" xmlns:p="http://schemas.openxmlformats.org/presentationml/2006/main">
+  <p:cSld>
+    <p:spTree>
+      <p:nvGrpSpPr>
+        <p:cNvPr id="1" name=""/>
+        <p:cNvGrpSpPr/>
+        <p:nvPr/>
+      </p:nvGrpSpPr>
+      <p:grpSpPr>
+        <a:xfrm>
+          <a:off x="0" y="0"/>
+          <a:ext cx="0" cy="0"/>
+          <a:chOff x="0" y="0"/>
+          <a:chExt cx="0" cy="0"/>
+        </a:xfrm>
+      </p:grpSpPr>
+      <p:pic>
+        <p:nvPicPr>
+          <p:cNvPr id="5" name="Picture 4">
+            <a:extLst>
+              <a:ext uri="{FF2B5EF4-FFF2-40B4-BE49-F238E27FC236}">
+                <a16:creationId xmlns:a16="http://schemas.microsoft.com/office/drawing/2014/main" id="{F37E0954-C93D-4E4E-89C3-A7C02A566B8C}"/>
+              </a:ext>
+            </a:extLst>
+          </p:cNvPr>
+          <p:cNvPicPr>
+            <a:picLocks noChangeAspect="1"/>
+          </p:cNvPicPr>
+          <p:nvPr/>
+        </p:nvPicPr>
+        <p:blipFill>
+          <a:blip r:embed="rId2"/>
+          <a:stretch>
+            <a:fillRect/>
+          </a:stretch>
+        </p:blipFill>
+        <p:spPr>
+          <a:xfrm>
+            <a:off x="0" y="0"/>
+            <a:ext cx="12192000" cy="1819917"/>
+          </a:xfrm>
+          <a:prstGeom prst="rect">
+            <a:avLst/>
+          </a:prstGeom>
+        </p:spPr>
+      </p:pic>
+      <p:sp>
+        <p:nvSpPr>
+          <p:cNvPr id="2" name="Title 1">
+            <a:extLst>
+              <a:ext uri="{FF2B5EF4-FFF2-40B4-BE49-F238E27FC236}">
+                <a16:creationId xmlns:a16="http://schemas.microsoft.com/office/drawing/2014/main" id="{027EE828-B2F2-4E7F-A4C7-BEDBF0D9EED9}"/>
+              </a:ext>
+            </a:extLst>
+          </p:cNvPr>
+          <p:cNvSpPr>
+            <a:spLocks noGrp="1"/>
+          </p:cNvSpPr>
+          <p:nvPr>
+            <p:ph type="title"/>
+          </p:nvPr>
+        </p:nvSpPr>
+        <p:spPr/>
+        <p:txBody>
+          <a:bodyPr>
+            <a:normAutofit/>
+          </a:bodyPr>
+          <a:lstStyle/>
+          <a:p>
+            <a:r>
+              <a:rPr lang="en-US" sz="3600" dirty="0"/>
+              <a:t>Analyses of Feature Matrix</a:t>
+            </a:r>
+            <a:endParaRPr lang="en-US" sz="2800" dirty="0"/>
+          </a:p>
+        </p:txBody>
+      </p:sp>
+      <p:sp>
+        <p:nvSpPr>
+          <p:cNvPr id="6" name="Content Placeholder 2">
+            <a:extLst>
+              <a:ext uri="{FF2B5EF4-FFF2-40B4-BE49-F238E27FC236}">
+                <a16:creationId xmlns:a16="http://schemas.microsoft.com/office/drawing/2014/main" id="{CF143FC4-8FB5-4B4A-BC87-767AD5802D79}"/>
+              </a:ext>
+            </a:extLst>
+          </p:cNvPr>
+          <p:cNvSpPr>
+            <a:spLocks noGrp="1"/>
+          </p:cNvSpPr>
+          <p:nvPr>
+            <p:ph idx="1"/>
+          </p:nvPr>
+        </p:nvSpPr>
+        <p:spPr>
+          <a:xfrm>
+            <a:off x="838200" y="1825625"/>
+            <a:ext cx="10515600" cy="4351338"/>
+          </a:xfrm>
+        </p:spPr>
+        <p:txBody>
+          <a:bodyPr>
+            <a:normAutofit/>
+          </a:bodyPr>
+          <a:lstStyle/>
+          <a:p>
+            <a:pPr marL="0" indent="0">
+              <a:buNone/>
+            </a:pPr>
+            <a:endParaRPr lang="en-US" dirty="0"/>
+          </a:p>
+          <a:p>
+            <a:pPr marL="0" indent="0">
+              <a:buNone/>
+            </a:pPr>
+            <a:r>
+              <a:rPr lang="en-US" dirty="0"/>
+              <a:t>We might rely on autogenerated analyses by Qualtrics.</a:t>
+            </a:r>
+          </a:p>
+          <a:p>
+            <a:pPr marL="0" indent="0">
+              <a:buNone/>
+            </a:pPr>
+            <a:endParaRPr lang="en-US" dirty="0"/>
+          </a:p>
+          <a:p>
+            <a:pPr marL="0" indent="0">
+              <a:buNone/>
+            </a:pPr>
+            <a:r>
+              <a:rPr lang="en-US" dirty="0"/>
+              <a:t>We might or guide analyses using Qualtrics.</a:t>
+            </a:r>
+          </a:p>
+          <a:p>
+            <a:pPr marL="0" indent="0">
+              <a:buNone/>
+            </a:pPr>
+            <a:endParaRPr lang="en-US" dirty="0"/>
+          </a:p>
+          <a:p>
+            <a:pPr marL="0" indent="0">
+              <a:buNone/>
+            </a:pPr>
+            <a:r>
+              <a:rPr lang="en-US" dirty="0"/>
+              <a:t>See “Analyses of Feature Matrix”.</a:t>
+            </a:r>
+          </a:p>
+        </p:txBody>
+      </p:sp>
+    </p:spTree>
+    <p:extLst>
+      <p:ext uri="{BB962C8B-B14F-4D97-AF65-F5344CB8AC3E}">
+        <p14:creationId xmlns:p14="http://schemas.microsoft.com/office/powerpoint/2010/main" val="3203007204"/>
+      </p:ext>
+    </p:extLst>
+  </p:cSld>
+  <p:clrMapOvr>
+    <a:masterClrMapping/>
+  </p:clrMapOvr>
+</p:sld>
+</file>
+
+<file path=ppt/slides/slide14.xml><?xml version="1.0" encoding="utf-8"?>
+<p:sld xmlns:a="http://schemas.openxmlformats.org/drawingml/2006/main" xmlns:r="http://schemas.openxmlformats.org/officeDocument/2006/relationships" xmlns:p="http://schemas.openxmlformats.org/presentationml/2006/main">
+  <p:cSld>
+    <p:spTree>
+      <p:nvGrpSpPr>
+        <p:cNvPr id="1" name=""/>
+        <p:cNvGrpSpPr/>
+        <p:nvPr/>
+      </p:nvGrpSpPr>
+      <p:grpSpPr>
+        <a:xfrm>
+          <a:off x="0" y="0"/>
+          <a:ext cx="0" cy="0"/>
+          <a:chOff x="0" y="0"/>
+          <a:chExt cx="0" cy="0"/>
+        </a:xfrm>
+      </p:grpSpPr>
+      <p:pic>
+        <p:nvPicPr>
+          <p:cNvPr id="5" name="Picture 4">
+            <a:extLst>
+              <a:ext uri="{FF2B5EF4-FFF2-40B4-BE49-F238E27FC236}">
+                <a16:creationId xmlns:a16="http://schemas.microsoft.com/office/drawing/2014/main" id="{F37E0954-C93D-4E4E-89C3-A7C02A566B8C}"/>
+              </a:ext>
+            </a:extLst>
+          </p:cNvPr>
+          <p:cNvPicPr>
+            <a:picLocks noChangeAspect="1"/>
+          </p:cNvPicPr>
+          <p:nvPr/>
+        </p:nvPicPr>
+        <p:blipFill>
+          <a:blip r:embed="rId2"/>
+          <a:stretch>
+            <a:fillRect/>
+          </a:stretch>
+        </p:blipFill>
+        <p:spPr>
+          <a:xfrm>
+            <a:off x="0" y="0"/>
+            <a:ext cx="12192000" cy="1819917"/>
+          </a:xfrm>
+          <a:prstGeom prst="rect">
+            <a:avLst/>
+          </a:prstGeom>
+        </p:spPr>
+      </p:pic>
+      <p:sp>
+        <p:nvSpPr>
+          <p:cNvPr id="2" name="Title 1">
+            <a:extLst>
+              <a:ext uri="{FF2B5EF4-FFF2-40B4-BE49-F238E27FC236}">
+                <a16:creationId xmlns:a16="http://schemas.microsoft.com/office/drawing/2014/main" id="{027EE828-B2F2-4E7F-A4C7-BEDBF0D9EED9}"/>
+              </a:ext>
+            </a:extLst>
+          </p:cNvPr>
+          <p:cNvSpPr>
+            <a:spLocks noGrp="1"/>
+          </p:cNvSpPr>
+          <p:nvPr>
+            <p:ph type="title"/>
+          </p:nvPr>
+        </p:nvSpPr>
+        <p:spPr/>
+        <p:txBody>
+          <a:bodyPr>
+            <a:normAutofit/>
+          </a:bodyPr>
+          <a:lstStyle/>
+          <a:p>
+            <a:r>
+              <a:rPr lang="en-US" sz="3600" dirty="0"/>
+              <a:t>Report</a:t>
+            </a:r>
+            <a:endParaRPr lang="en-US" sz="2800" dirty="0"/>
+          </a:p>
+        </p:txBody>
+      </p:sp>
+      <p:sp>
+        <p:nvSpPr>
+          <p:cNvPr id="6" name="Content Placeholder 2">
+            <a:extLst>
+              <a:ext uri="{FF2B5EF4-FFF2-40B4-BE49-F238E27FC236}">
+                <a16:creationId xmlns:a16="http://schemas.microsoft.com/office/drawing/2014/main" id="{CF143FC4-8FB5-4B4A-BC87-767AD5802D79}"/>
+              </a:ext>
+            </a:extLst>
+          </p:cNvPr>
+          <p:cNvSpPr>
+            <a:spLocks noGrp="1"/>
+          </p:cNvSpPr>
+          <p:nvPr>
+            <p:ph idx="1"/>
+          </p:nvPr>
+        </p:nvSpPr>
+        <p:spPr>
+          <a:xfrm>
+            <a:off x="838200" y="1825625"/>
+            <a:ext cx="10515600" cy="4351338"/>
+          </a:xfrm>
+        </p:spPr>
+        <p:txBody>
+          <a:bodyPr>
+            <a:normAutofit fontScale="92500" lnSpcReduction="20000"/>
+          </a:bodyPr>
+          <a:lstStyle/>
+          <a:p>
+            <a:pPr marL="0" indent="0">
+              <a:buNone/>
+            </a:pPr>
+            <a:r>
+              <a:rPr lang="en-US" dirty="0"/>
+              <a:t>Executive summary and presentation and analysis of data</a:t>
+            </a:r>
+          </a:p>
+          <a:p>
+            <a:pPr marL="0" indent="0">
+              <a:buNone/>
+            </a:pPr>
+            <a:endParaRPr lang="en-US" dirty="0"/>
+          </a:p>
+          <a:p>
+            <a:pPr marL="0" indent="0">
+              <a:buNone/>
+            </a:pPr>
+            <a:r>
+              <a:rPr lang="en-US" dirty="0"/>
+              <a:t>Executive summary, description of data, discussion of questions of interest</a:t>
+            </a:r>
+          </a:p>
+          <a:p>
+            <a:pPr marL="0" indent="0">
+              <a:buNone/>
+            </a:pPr>
+            <a:endParaRPr lang="en-US" dirty="0"/>
+          </a:p>
+          <a:p>
+            <a:pPr marL="0" indent="0">
+              <a:buNone/>
+            </a:pPr>
+            <a:r>
+              <a:rPr lang="en-US" dirty="0"/>
+              <a:t>Dashboard</a:t>
+            </a:r>
+          </a:p>
+          <a:p>
+            <a:pPr marL="0" indent="0">
+              <a:buNone/>
+            </a:pPr>
+            <a:endParaRPr lang="en-US" dirty="0"/>
+          </a:p>
+          <a:p>
+            <a:pPr marL="0" indent="0">
+              <a:buNone/>
+            </a:pPr>
+            <a:r>
+              <a:rPr lang="en-US" dirty="0"/>
+              <a:t>Introduction, discussion of data, discussion of methods, analysis, conclusions, appendices</a:t>
+            </a:r>
+          </a:p>
+          <a:p>
+            <a:pPr marL="0" indent="0">
+              <a:buNone/>
+            </a:pPr>
+            <a:endParaRPr lang="en-US" dirty="0"/>
+          </a:p>
+          <a:p>
+            <a:pPr marL="0" indent="0">
+              <a:buNone/>
+            </a:pPr>
+            <a:r>
+              <a:rPr lang="en-US" dirty="0"/>
+              <a:t>Abstract, introduction, motivation, methods, experiments, results, conclusion, contributions, references, appendices</a:t>
+            </a:r>
+          </a:p>
+        </p:txBody>
+      </p:sp>
+    </p:spTree>
+    <p:extLst>
+      <p:ext uri="{BB962C8B-B14F-4D97-AF65-F5344CB8AC3E}">
+        <p14:creationId xmlns:p14="http://schemas.microsoft.com/office/powerpoint/2010/main" val="1675041421"/>
+      </p:ext>
+    </p:extLst>
+  </p:cSld>
+  <p:clrMapOvr>
+    <a:masterClrMapping/>
+  </p:clrMapOvr>
+</p:sld>
+</file>
+
+<file path=ppt/slides/slide15.xml><?xml version="1.0" encoding="utf-8"?>
+<p:sld xmlns:a="http://schemas.openxmlformats.org/drawingml/2006/main" xmlns:r="http://schemas.openxmlformats.org/officeDocument/2006/relationships" xmlns:p="http://schemas.openxmlformats.org/presentationml/2006/main">
+  <p:cSld>
+    <p:spTree>
+      <p:nvGrpSpPr>
+        <p:cNvPr id="1" name=""/>
+        <p:cNvGrpSpPr/>
+        <p:nvPr/>
+      </p:nvGrpSpPr>
+      <p:grpSpPr>
+        <a:xfrm>
+          <a:off x="0" y="0"/>
+          <a:ext cx="0" cy="0"/>
+          <a:chOff x="0" y="0"/>
+          <a:chExt cx="0" cy="0"/>
+        </a:xfrm>
+      </p:grpSpPr>
+      <p:pic>
+        <p:nvPicPr>
+          <p:cNvPr id="5" name="Picture 4">
+            <a:extLst>
+              <a:ext uri="{FF2B5EF4-FFF2-40B4-BE49-F238E27FC236}">
+                <a16:creationId xmlns:a16="http://schemas.microsoft.com/office/drawing/2014/main" id="{F37E0954-C93D-4E4E-89C3-A7C02A566B8C}"/>
+              </a:ext>
+            </a:extLst>
+          </p:cNvPr>
+          <p:cNvPicPr>
+            <a:picLocks noChangeAspect="1"/>
+          </p:cNvPicPr>
+          <p:nvPr/>
+        </p:nvPicPr>
+        <p:blipFill>
+          <a:blip r:embed="rId2"/>
+          <a:stretch>
+            <a:fillRect/>
+          </a:stretch>
+        </p:blipFill>
+        <p:spPr>
+          <a:xfrm>
+            <a:off x="0" y="5708"/>
+            <a:ext cx="12192000" cy="1819917"/>
+          </a:xfrm>
+          <a:prstGeom prst="rect">
+            <a:avLst/>
+          </a:prstGeom>
+        </p:spPr>
+      </p:pic>
+      <p:sp>
+        <p:nvSpPr>
+          <p:cNvPr id="2" name="Title 1">
+            <a:extLst>
+              <a:ext uri="{FF2B5EF4-FFF2-40B4-BE49-F238E27FC236}">
+                <a16:creationId xmlns:a16="http://schemas.microsoft.com/office/drawing/2014/main" id="{027EE828-B2F2-4E7F-A4C7-BEDBF0D9EED9}"/>
+              </a:ext>
+            </a:extLst>
+          </p:cNvPr>
+          <p:cNvSpPr>
+            <a:spLocks noGrp="1"/>
+          </p:cNvSpPr>
+          <p:nvPr>
+            <p:ph type="title"/>
+          </p:nvPr>
+        </p:nvSpPr>
+        <p:spPr/>
+        <p:txBody>
+          <a:bodyPr>
+            <a:normAutofit/>
+          </a:bodyPr>
+          <a:lstStyle/>
+          <a:p>
+            <a:r>
+              <a:rPr lang="en-US" sz="3600" dirty="0"/>
+              <a:t>Presentation to Stakeholders</a:t>
+            </a:r>
+            <a:endParaRPr lang="en-US" sz="2800" dirty="0"/>
+          </a:p>
+        </p:txBody>
+      </p:sp>
+      <p:sp>
+        <p:nvSpPr>
+          <p:cNvPr id="6" name="Content Placeholder 2">
+            <a:extLst>
+              <a:ext uri="{FF2B5EF4-FFF2-40B4-BE49-F238E27FC236}">
+                <a16:creationId xmlns:a16="http://schemas.microsoft.com/office/drawing/2014/main" id="{CF143FC4-8FB5-4B4A-BC87-767AD5802D79}"/>
+              </a:ext>
+            </a:extLst>
+          </p:cNvPr>
+          <p:cNvSpPr>
+            <a:spLocks noGrp="1"/>
+          </p:cNvSpPr>
+          <p:nvPr>
+            <p:ph idx="1"/>
+          </p:nvPr>
+        </p:nvSpPr>
+        <p:spPr>
+          <a:xfrm>
+            <a:off x="838200" y="1825625"/>
+            <a:ext cx="10515600" cy="4351338"/>
+          </a:xfrm>
+        </p:spPr>
+        <p:txBody>
+          <a:bodyPr>
+            <a:normAutofit/>
+          </a:bodyPr>
+          <a:lstStyle/>
+          <a:p>
+            <a:pPr marL="0" indent="0">
+              <a:buNone/>
+            </a:pPr>
+            <a:endParaRPr lang="en-US" dirty="0"/>
+          </a:p>
+          <a:p>
+            <a:pPr marL="0" indent="0">
+              <a:buNone/>
+            </a:pPr>
+            <a:r>
+              <a:rPr lang="en-US" dirty="0"/>
+              <a:t>Like this one, with focus on conclusions</a:t>
+            </a:r>
+          </a:p>
+        </p:txBody>
+      </p:sp>
+    </p:spTree>
+    <p:extLst>
+      <p:ext uri="{BB962C8B-B14F-4D97-AF65-F5344CB8AC3E}">
+        <p14:creationId xmlns:p14="http://schemas.microsoft.com/office/powerpoint/2010/main" val="2366845105"/>
+      </p:ext>
+    </p:extLst>
+  </p:cSld>
+  <p:clrMapOvr>
+    <a:masterClrMapping/>
+  </p:clrMapOvr>
+</p:sld>
+</file>
+
+<file path=ppt/slides/slide16.xml><?xml version="1.0" encoding="utf-8"?>
+<p:sld xmlns:a="http://schemas.openxmlformats.org/drawingml/2006/main" xmlns:r="http://schemas.openxmlformats.org/officeDocument/2006/relationships" xmlns:p="http://schemas.openxmlformats.org/presentationml/2006/main">
+  <p:cSld>
+    <p:spTree>
+      <p:nvGrpSpPr>
+        <p:cNvPr id="1" name=""/>
+        <p:cNvGrpSpPr/>
+        <p:nvPr/>
+      </p:nvGrpSpPr>
+      <p:grpSpPr>
+        <a:xfrm>
+          <a:off x="0" y="0"/>
+          <a:ext cx="0" cy="0"/>
+          <a:chOff x="0" y="0"/>
+          <a:chExt cx="0" cy="0"/>
+        </a:xfrm>
+      </p:grpSpPr>
+      <p:pic>
+        <p:nvPicPr>
+          <p:cNvPr id="5" name="Picture 4">
+            <a:extLst>
+              <a:ext uri="{FF2B5EF4-FFF2-40B4-BE49-F238E27FC236}">
+                <a16:creationId xmlns:a16="http://schemas.microsoft.com/office/drawing/2014/main" id="{F37E0954-C93D-4E4E-89C3-A7C02A566B8C}"/>
+              </a:ext>
+            </a:extLst>
+          </p:cNvPr>
+          <p:cNvPicPr>
+            <a:picLocks noChangeAspect="1"/>
+          </p:cNvPicPr>
+          <p:nvPr/>
+        </p:nvPicPr>
+        <p:blipFill>
+          <a:blip r:embed="rId2"/>
+          <a:stretch>
+            <a:fillRect/>
+          </a:stretch>
+        </p:blipFill>
+        <p:spPr>
+          <a:xfrm>
+            <a:off x="0" y="-1"/>
+            <a:ext cx="12192000" cy="1819917"/>
+          </a:xfrm>
+          <a:prstGeom prst="rect">
+            <a:avLst/>
+          </a:prstGeom>
+        </p:spPr>
+      </p:pic>
+      <p:sp>
+        <p:nvSpPr>
+          <p:cNvPr id="2" name="Title 1">
+            <a:extLst>
+              <a:ext uri="{FF2B5EF4-FFF2-40B4-BE49-F238E27FC236}">
+                <a16:creationId xmlns:a16="http://schemas.microsoft.com/office/drawing/2014/main" id="{027EE828-B2F2-4E7F-A4C7-BEDBF0D9EED9}"/>
+              </a:ext>
+            </a:extLst>
+          </p:cNvPr>
+          <p:cNvSpPr>
+            <a:spLocks noGrp="1"/>
+          </p:cNvSpPr>
+          <p:nvPr>
+            <p:ph type="title"/>
+          </p:nvPr>
+        </p:nvSpPr>
+        <p:spPr>
+          <a:xfrm>
+            <a:off x="838200" y="353094"/>
+            <a:ext cx="10515600" cy="1325563"/>
+          </a:xfrm>
+        </p:spPr>
+        <p:txBody>
+          <a:bodyPr>
+            <a:normAutofit/>
+          </a:bodyPr>
+          <a:lstStyle/>
+          <a:p>
+            <a:r>
+              <a:rPr lang="en-US" sz="3600" dirty="0"/>
+              <a:t>Updating Metadata</a:t>
+            </a:r>
+          </a:p>
+        </p:txBody>
+      </p:sp>
+      <p:pic>
+        <p:nvPicPr>
+          <p:cNvPr id="8" name="Picture 7">
+            <a:extLst>
+              <a:ext uri="{FF2B5EF4-FFF2-40B4-BE49-F238E27FC236}">
+                <a16:creationId xmlns:a16="http://schemas.microsoft.com/office/drawing/2014/main" id="{34A1A31E-7DF1-7229-20FE-5BE6D326683F}"/>
+              </a:ext>
+            </a:extLst>
+          </p:cNvPr>
+          <p:cNvPicPr>
+            <a:picLocks noChangeAspect="1"/>
+          </p:cNvPicPr>
+          <p:nvPr/>
+        </p:nvPicPr>
+        <p:blipFill>
+          <a:blip r:embed="rId3"/>
+          <a:stretch>
+            <a:fillRect/>
+          </a:stretch>
+        </p:blipFill>
+        <p:spPr>
+          <a:xfrm>
+            <a:off x="6052318" y="3242243"/>
+            <a:ext cx="6083567" cy="1525066"/>
+          </a:xfrm>
+          <a:prstGeom prst="rect">
+            <a:avLst/>
+          </a:prstGeom>
+        </p:spPr>
+      </p:pic>
+      <p:pic>
+        <p:nvPicPr>
+          <p:cNvPr id="6" name="Picture 5">
+            <a:extLst>
+              <a:ext uri="{FF2B5EF4-FFF2-40B4-BE49-F238E27FC236}">
+                <a16:creationId xmlns:a16="http://schemas.microsoft.com/office/drawing/2014/main" id="{5F41E630-98ED-C4B2-27CD-8408FCECB714}"/>
+              </a:ext>
+            </a:extLst>
+          </p:cNvPr>
+          <p:cNvPicPr>
+            <a:picLocks noChangeAspect="1"/>
+          </p:cNvPicPr>
+          <p:nvPr/>
+        </p:nvPicPr>
+        <p:blipFill>
+          <a:blip r:embed="rId4"/>
+          <a:stretch>
+            <a:fillRect/>
+          </a:stretch>
+        </p:blipFill>
+        <p:spPr>
+          <a:xfrm>
+            <a:off x="0" y="1819916"/>
+            <a:ext cx="6052318" cy="4953746"/>
+          </a:xfrm>
+          <a:prstGeom prst="rect">
+            <a:avLst/>
+          </a:prstGeom>
+        </p:spPr>
+      </p:pic>
+    </p:spTree>
+    <p:extLst>
+      <p:ext uri="{BB962C8B-B14F-4D97-AF65-F5344CB8AC3E}">
+        <p14:creationId xmlns:p14="http://schemas.microsoft.com/office/powerpoint/2010/main" val="2178992187"/>
+      </p:ext>
+    </p:extLst>
+  </p:cSld>
+  <p:clrMapOvr>
+    <a:masterClrMapping/>
+  </p:clrMapOvr>
+</p:sld>
+</file>
+
+<file path=ppt/slides/slide17.xml><?xml version="1.0" encoding="utf-8"?>
+<p:sld xmlns:a="http://schemas.openxmlformats.org/drawingml/2006/main" xmlns:r="http://schemas.openxmlformats.org/officeDocument/2006/relationships" xmlns:p="http://schemas.openxmlformats.org/presentationml/2006/main">
+  <p:cSld>
+    <p:spTree>
+      <p:nvGrpSpPr>
+        <p:cNvPr id="1" name=""/>
+        <p:cNvGrpSpPr/>
+        <p:nvPr/>
+      </p:nvGrpSpPr>
+      <p:grpSpPr>
+        <a:xfrm>
+          <a:off x="0" y="0"/>
+          <a:ext cx="0" cy="0"/>
+          <a:chOff x="0" y="0"/>
+          <a:chExt cx="0" cy="0"/>
+        </a:xfrm>
+      </p:grpSpPr>
+      <p:pic>
+        <p:nvPicPr>
+          <p:cNvPr id="5" name="Picture 4">
+            <a:extLst>
+              <a:ext uri="{FF2B5EF4-FFF2-40B4-BE49-F238E27FC236}">
+                <a16:creationId xmlns:a16="http://schemas.microsoft.com/office/drawing/2014/main" id="{F37E0954-C93D-4E4E-89C3-A7C02A566B8C}"/>
+              </a:ext>
+            </a:extLst>
+          </p:cNvPr>
+          <p:cNvPicPr>
+            <a:picLocks noChangeAspect="1"/>
+          </p:cNvPicPr>
+          <p:nvPr/>
+        </p:nvPicPr>
+        <p:blipFill>
+          <a:blip r:embed="rId2"/>
+          <a:stretch>
+            <a:fillRect/>
+          </a:stretch>
+        </p:blipFill>
+        <p:spPr>
+          <a:xfrm>
+            <a:off x="0" y="5708"/>
+            <a:ext cx="12192000" cy="1819917"/>
+          </a:xfrm>
+          <a:prstGeom prst="rect">
+            <a:avLst/>
+          </a:prstGeom>
+        </p:spPr>
+      </p:pic>
+      <p:sp>
+        <p:nvSpPr>
+          <p:cNvPr id="2" name="Title 1">
+            <a:extLst>
+              <a:ext uri="{FF2B5EF4-FFF2-40B4-BE49-F238E27FC236}">
+                <a16:creationId xmlns:a16="http://schemas.microsoft.com/office/drawing/2014/main" id="{027EE828-B2F2-4E7F-A4C7-BEDBF0D9EED9}"/>
+              </a:ext>
+            </a:extLst>
+          </p:cNvPr>
+          <p:cNvSpPr>
+            <a:spLocks noGrp="1"/>
+          </p:cNvSpPr>
+          <p:nvPr>
+            <p:ph type="title"/>
+          </p:nvPr>
+        </p:nvSpPr>
+        <p:spPr/>
+        <p:txBody>
+          <a:bodyPr>
+            <a:normAutofit/>
+          </a:bodyPr>
+          <a:lstStyle/>
+          <a:p>
+            <a:r>
+              <a:rPr lang="en-US" sz="3600" dirty="0"/>
+              <a:t>Feedback</a:t>
+            </a:r>
+            <a:endParaRPr lang="en-US" sz="2800" dirty="0"/>
+          </a:p>
+        </p:txBody>
+      </p:sp>
+      <p:pic>
+        <p:nvPicPr>
+          <p:cNvPr id="8" name="Picture 7">
+            <a:extLst>
+              <a:ext uri="{FF2B5EF4-FFF2-40B4-BE49-F238E27FC236}">
+                <a16:creationId xmlns:a16="http://schemas.microsoft.com/office/drawing/2014/main" id="{78B89255-64BF-4C6A-BB7E-CEFD655535C4}"/>
+              </a:ext>
+            </a:extLst>
+          </p:cNvPr>
+          <p:cNvPicPr>
+            <a:picLocks noChangeAspect="1"/>
+          </p:cNvPicPr>
+          <p:nvPr/>
+        </p:nvPicPr>
+        <p:blipFill>
+          <a:blip r:embed="rId3"/>
+          <a:stretch>
+            <a:fillRect/>
+          </a:stretch>
+        </p:blipFill>
+        <p:spPr>
+          <a:xfrm>
+            <a:off x="4319628" y="1835638"/>
+            <a:ext cx="3552743" cy="5032375"/>
+          </a:xfrm>
+          <a:prstGeom prst="rect">
+            <a:avLst/>
+          </a:prstGeom>
+        </p:spPr>
+      </p:pic>
+    </p:spTree>
+    <p:extLst>
+      <p:ext uri="{BB962C8B-B14F-4D97-AF65-F5344CB8AC3E}">
+        <p14:creationId xmlns:p14="http://schemas.microsoft.com/office/powerpoint/2010/main" val="3553244050"/>
+      </p:ext>
+    </p:extLst>
+  </p:cSld>
+  <p:clrMapOvr>
+    <a:masterClrMapping/>
+  </p:clrMapOvr>
+</p:sld>
+</file>
+
+<file path=ppt/slides/slide18.xml><?xml version="1.0" encoding="utf-8"?>
+<p:sld xmlns:a="http://schemas.openxmlformats.org/drawingml/2006/main" xmlns:r="http://schemas.openxmlformats.org/officeDocument/2006/relationships" xmlns:p="http://schemas.openxmlformats.org/presentationml/2006/main">
+  <p:cSld>
+    <p:spTree>
+      <p:nvGrpSpPr>
+        <p:cNvPr id="1" name=""/>
+        <p:cNvGrpSpPr/>
+        <p:nvPr/>
+      </p:nvGrpSpPr>
+      <p:grpSpPr>
+        <a:xfrm>
+          <a:off x="0" y="0"/>
+          <a:ext cx="0" cy="0"/>
+          <a:chOff x="0" y="0"/>
+          <a:chExt cx="0" cy="0"/>
+        </a:xfrm>
+      </p:grpSpPr>
+      <p:pic>
+        <p:nvPicPr>
+          <p:cNvPr id="5" name="Picture 4">
+            <a:extLst>
+              <a:ext uri="{FF2B5EF4-FFF2-40B4-BE49-F238E27FC236}">
+                <a16:creationId xmlns:a16="http://schemas.microsoft.com/office/drawing/2014/main" id="{F37E0954-C93D-4E4E-89C3-A7C02A566B8C}"/>
+              </a:ext>
+            </a:extLst>
+          </p:cNvPr>
+          <p:cNvPicPr>
+            <a:picLocks noChangeAspect="1"/>
+          </p:cNvPicPr>
+          <p:nvPr/>
+        </p:nvPicPr>
+        <p:blipFill>
+          <a:blip r:embed="rId2"/>
+          <a:stretch>
+            <a:fillRect/>
+          </a:stretch>
+        </p:blipFill>
+        <p:spPr>
+          <a:xfrm>
+            <a:off x="0" y="0"/>
+            <a:ext cx="12192000" cy="1819917"/>
+          </a:xfrm>
+          <a:prstGeom prst="rect">
+            <a:avLst/>
+          </a:prstGeom>
+        </p:spPr>
+      </p:pic>
+      <p:sp>
+        <p:nvSpPr>
+          <p:cNvPr id="2" name="Title 1">
+            <a:extLst>
+              <a:ext uri="{FF2B5EF4-FFF2-40B4-BE49-F238E27FC236}">
+                <a16:creationId xmlns:a16="http://schemas.microsoft.com/office/drawing/2014/main" id="{027EE828-B2F2-4E7F-A4C7-BEDBF0D9EED9}"/>
+              </a:ext>
+            </a:extLst>
+          </p:cNvPr>
+          <p:cNvSpPr>
+            <a:spLocks noGrp="1"/>
+          </p:cNvSpPr>
+          <p:nvPr>
+            <p:ph type="title"/>
+          </p:nvPr>
+        </p:nvSpPr>
+        <p:spPr/>
+        <p:txBody>
+          <a:bodyPr>
+            <a:normAutofit/>
+          </a:bodyPr>
+          <a:lstStyle/>
+          <a:p>
+            <a:r>
+              <a:rPr lang="en-US" sz="3600" dirty="0"/>
+              <a:t>Meet to Consider Changes</a:t>
+            </a:r>
+            <a:endParaRPr lang="en-US" sz="2800" dirty="0"/>
+          </a:p>
+        </p:txBody>
+      </p:sp>
+      <p:sp>
+        <p:nvSpPr>
+          <p:cNvPr id="3" name="Content Placeholder 2">
+            <a:extLst>
+              <a:ext uri="{FF2B5EF4-FFF2-40B4-BE49-F238E27FC236}">
+                <a16:creationId xmlns:a16="http://schemas.microsoft.com/office/drawing/2014/main" id="{35523A45-A413-DFE5-CA5C-72786DE34423}"/>
+              </a:ext>
+            </a:extLst>
+          </p:cNvPr>
+          <p:cNvSpPr>
+            <a:spLocks noGrp="1"/>
+          </p:cNvSpPr>
+          <p:nvPr>
+            <p:ph idx="1"/>
+          </p:nvPr>
+        </p:nvSpPr>
+        <p:spPr>
+          <a:xfrm>
+            <a:off x="838200" y="1825625"/>
+            <a:ext cx="10515600" cy="4351338"/>
+          </a:xfrm>
+        </p:spPr>
+        <p:txBody>
+          <a:bodyPr>
+            <a:normAutofit/>
+          </a:bodyPr>
+          <a:lstStyle/>
+          <a:p>
+            <a:pPr marL="0" indent="0">
+              <a:buNone/>
+            </a:pPr>
+            <a:endParaRPr lang="en-US" dirty="0"/>
+          </a:p>
+          <a:p>
+            <a:pPr marL="0" indent="0">
+              <a:buNone/>
+            </a:pPr>
+            <a:r>
+              <a:rPr lang="en-US" dirty="0"/>
+              <a:t>BSDS program</a:t>
+            </a:r>
+          </a:p>
+          <a:p>
+            <a:pPr marL="0" indent="0">
+              <a:buNone/>
+            </a:pPr>
+            <a:endParaRPr lang="en-US" dirty="0"/>
+          </a:p>
+          <a:p>
+            <a:pPr marL="0" indent="0">
+              <a:buNone/>
+            </a:pPr>
+            <a:r>
+              <a:rPr lang="en-US" dirty="0"/>
+              <a:t>Questionnaire of students</a:t>
+            </a:r>
+          </a:p>
+        </p:txBody>
+      </p:sp>
+    </p:spTree>
+    <p:extLst>
+      <p:ext uri="{BB962C8B-B14F-4D97-AF65-F5344CB8AC3E}">
+        <p14:creationId xmlns:p14="http://schemas.microsoft.com/office/powerpoint/2010/main" val="2352899606"/>
+      </p:ext>
+    </p:extLst>
+  </p:cSld>
+  <p:clrMapOvr>
+    <a:masterClrMapping/>
+  </p:clrMapOvr>
+</p:sld>
+</file>
+
+<file path=ppt/slides/slide19.xml><?xml version="1.0" encoding="utf-8"?>
+<p:sld xmlns:a="http://schemas.openxmlformats.org/drawingml/2006/main" xmlns:r="http://schemas.openxmlformats.org/officeDocument/2006/relationships" xmlns:p="http://schemas.openxmlformats.org/presentationml/2006/main">
+  <p:cSld>
+    <p:spTree>
+      <p:nvGrpSpPr>
+        <p:cNvPr id="1" name=""/>
+        <p:cNvGrpSpPr/>
+        <p:nvPr/>
+      </p:nvGrpSpPr>
+      <p:grpSpPr>
+        <a:xfrm>
+          <a:off x="0" y="0"/>
+          <a:ext cx="0" cy="0"/>
+          <a:chOff x="0" y="0"/>
+          <a:chExt cx="0" cy="0"/>
+        </a:xfrm>
+      </p:grpSpPr>
+      <p:pic>
+        <p:nvPicPr>
+          <p:cNvPr id="5" name="Picture 4">
+            <a:extLst>
+              <a:ext uri="{FF2B5EF4-FFF2-40B4-BE49-F238E27FC236}">
+                <a16:creationId xmlns:a16="http://schemas.microsoft.com/office/drawing/2014/main" id="{F37E0954-C93D-4E4E-89C3-A7C02A566B8C}"/>
+              </a:ext>
+            </a:extLst>
+          </p:cNvPr>
+          <p:cNvPicPr>
+            <a:picLocks noChangeAspect="1"/>
+          </p:cNvPicPr>
+          <p:nvPr/>
+        </p:nvPicPr>
+        <p:blipFill>
+          <a:blip r:embed="rId2"/>
+          <a:stretch>
+            <a:fillRect/>
+          </a:stretch>
+        </p:blipFill>
+        <p:spPr>
+          <a:xfrm>
+            <a:off x="0" y="0"/>
+            <a:ext cx="12192000" cy="1819917"/>
+          </a:xfrm>
+          <a:prstGeom prst="rect">
+            <a:avLst/>
+          </a:prstGeom>
+        </p:spPr>
+      </p:pic>
+      <p:sp>
+        <p:nvSpPr>
+          <p:cNvPr id="2" name="Title 1">
+            <a:extLst>
+              <a:ext uri="{FF2B5EF4-FFF2-40B4-BE49-F238E27FC236}">
+                <a16:creationId xmlns:a16="http://schemas.microsoft.com/office/drawing/2014/main" id="{027EE828-B2F2-4E7F-A4C7-BEDBF0D9EED9}"/>
+              </a:ext>
+            </a:extLst>
+          </p:cNvPr>
+          <p:cNvSpPr>
+            <a:spLocks noGrp="1"/>
+          </p:cNvSpPr>
+          <p:nvPr>
+            <p:ph type="title"/>
+          </p:nvPr>
+        </p:nvSpPr>
+        <p:spPr/>
+        <p:txBody>
+          <a:bodyPr>
+            <a:normAutofit/>
+          </a:bodyPr>
+          <a:lstStyle/>
+          <a:p>
+            <a:r>
+              <a:rPr lang="en-US" sz="3600" dirty="0"/>
+              <a:t>Communicate</a:t>
+            </a:r>
+            <a:endParaRPr lang="en-US" sz="2800" dirty="0"/>
+          </a:p>
+        </p:txBody>
+      </p:sp>
+      <p:sp>
+        <p:nvSpPr>
+          <p:cNvPr id="3" name="Content Placeholder 2">
+            <a:extLst>
+              <a:ext uri="{FF2B5EF4-FFF2-40B4-BE49-F238E27FC236}">
+                <a16:creationId xmlns:a16="http://schemas.microsoft.com/office/drawing/2014/main" id="{7C52B63E-2613-29D4-FFA7-9E0798C4D394}"/>
+              </a:ext>
+            </a:extLst>
+          </p:cNvPr>
+          <p:cNvSpPr>
+            <a:spLocks noGrp="1"/>
+          </p:cNvSpPr>
+          <p:nvPr>
+            <p:ph idx="1"/>
+          </p:nvPr>
+        </p:nvSpPr>
+        <p:spPr>
+          <a:xfrm>
+            <a:off x="838200" y="1825625"/>
+            <a:ext cx="10515600" cy="4351338"/>
+          </a:xfrm>
+        </p:spPr>
+        <p:txBody>
+          <a:bodyPr>
+            <a:normAutofit/>
+          </a:bodyPr>
+          <a:lstStyle/>
+          <a:p>
+            <a:pPr marL="0" indent="0">
+              <a:buNone/>
+            </a:pPr>
+            <a:endParaRPr lang="en-US" dirty="0"/>
+          </a:p>
+          <a:p>
+            <a:pPr marL="0" indent="0">
+              <a:buNone/>
+            </a:pPr>
+            <a:r>
+              <a:rPr lang="en-US" dirty="0"/>
+              <a:t>Thank students and leaders who responded</a:t>
+            </a:r>
+          </a:p>
+          <a:p>
+            <a:pPr marL="0" indent="0">
+              <a:buNone/>
+            </a:pPr>
+            <a:endParaRPr lang="en-US" dirty="0"/>
+          </a:p>
+          <a:p>
+            <a:pPr marL="0" indent="0">
+              <a:buNone/>
+            </a:pPr>
+            <a:r>
+              <a:rPr lang="en-US" dirty="0"/>
+              <a:t>Inform students of any changes to the BSDS program</a:t>
+            </a:r>
+          </a:p>
+        </p:txBody>
+      </p:sp>
+    </p:spTree>
+    <p:extLst>
+      <p:ext uri="{BB962C8B-B14F-4D97-AF65-F5344CB8AC3E}">
+        <p14:creationId xmlns:p14="http://schemas.microsoft.com/office/powerpoint/2010/main" val="3218191581"/>
       </p:ext>
     </p:extLst>
   </p:cSld>
@@ -4712,7 +5916,7 @@
         </p:blipFill>
         <p:spPr>
           <a:xfrm>
-            <a:off x="0" y="-1"/>
+            <a:off x="0" y="0"/>
             <a:ext cx="12192000" cy="1819917"/>
           </a:xfrm>
           <a:prstGeom prst="rect">
@@ -4736,12 +5940,7 @@
             <p:ph type="title"/>
           </p:nvPr>
         </p:nvSpPr>
-        <p:spPr>
-          <a:xfrm>
-            <a:off x="838200" y="353094"/>
-            <a:ext cx="10515600" cy="1325563"/>
-          </a:xfrm>
-        </p:spPr>
+        <p:spPr/>
         <p:txBody>
           <a:bodyPr>
             <a:normAutofit/>
@@ -4750,51 +5949,60 @@
           <a:p>
             <a:r>
               <a:rPr lang="en-US" sz="3600" dirty="0"/>
-              <a:t>Questionnaire to Improve Course</a:t>
-            </a:r>
-          </a:p>
-        </p:txBody>
-      </p:sp>
-      <p:pic>
-        <p:nvPicPr>
-          <p:cNvPr id="9" name="Picture 8">
-            <a:extLst>
-              <a:ext uri="{FF2B5EF4-FFF2-40B4-BE49-F238E27FC236}">
-                <a16:creationId xmlns:a16="http://schemas.microsoft.com/office/drawing/2014/main" id="{EEE7FE14-330D-7531-3881-5B547EEB1928}"/>
-              </a:ext>
-            </a:extLst>
-          </p:cNvPr>
-          <p:cNvPicPr>
-            <a:picLocks noChangeAspect="1"/>
-          </p:cNvPicPr>
-          <p:nvPr/>
-        </p:nvPicPr>
-        <p:blipFill>
-          <a:blip r:embed="rId3">
-            <a:extLst>
-              <a:ext uri="{28A0092B-C50C-407E-A947-70E740481C1C}">
-                <a14:useLocalDpi xmlns:a14="http://schemas.microsoft.com/office/drawing/2010/main" val="0"/>
-              </a:ext>
-            </a:extLst>
-          </a:blip>
-          <a:stretch>
-            <a:fillRect/>
-          </a:stretch>
-        </p:blipFill>
-        <p:spPr>
-          <a:xfrm>
-            <a:off x="4152900" y="1819962"/>
-            <a:ext cx="3886200" cy="5038038"/>
-          </a:xfrm>
-          <a:prstGeom prst="rect">
-            <a:avLst/>
-          </a:prstGeom>
-        </p:spPr>
-      </p:pic>
+              <a:t>Proposal</a:t>
+            </a:r>
+            <a:endParaRPr lang="en-US" sz="2800" dirty="0"/>
+          </a:p>
+        </p:txBody>
+      </p:sp>
+      <p:sp>
+        <p:nvSpPr>
+          <p:cNvPr id="6" name="Content Placeholder 2">
+            <a:extLst>
+              <a:ext uri="{FF2B5EF4-FFF2-40B4-BE49-F238E27FC236}">
+                <a16:creationId xmlns:a16="http://schemas.microsoft.com/office/drawing/2014/main" id="{CF143FC4-8FB5-4B4A-BC87-767AD5802D79}"/>
+              </a:ext>
+            </a:extLst>
+          </p:cNvPr>
+          <p:cNvSpPr>
+            <a:spLocks noGrp="1"/>
+          </p:cNvSpPr>
+          <p:nvPr>
+            <p:ph idx="1"/>
+          </p:nvPr>
+        </p:nvSpPr>
+        <p:spPr>
+          <a:xfrm>
+            <a:off x="838200" y="1825625"/>
+            <a:ext cx="10515600" cy="4351338"/>
+          </a:xfrm>
+        </p:spPr>
+        <p:txBody>
+          <a:bodyPr>
+            <a:normAutofit/>
+          </a:bodyPr>
+          <a:lstStyle/>
+          <a:p>
+            <a:pPr marL="0" indent="0">
+              <a:buNone/>
+            </a:pPr>
+            <a:endParaRPr lang="en-US" dirty="0"/>
+          </a:p>
+          <a:p>
+            <a:pPr marL="0" indent="0">
+              <a:buNone/>
+            </a:pPr>
+            <a:r>
+              <a:rPr lang="en-US" dirty="0"/>
+              <a:t>Introduction, discussion of questions of interest, discussion of models, discussion of data visualizations</a:t>
+            </a:r>
+          </a:p>
+        </p:txBody>
+      </p:sp>
     </p:spTree>
     <p:extLst>
       <p:ext uri="{BB962C8B-B14F-4D97-AF65-F5344CB8AC3E}">
-        <p14:creationId xmlns:p14="http://schemas.microsoft.com/office/powerpoint/2010/main" val="3025373490"/>
+        <p14:creationId xmlns:p14="http://schemas.microsoft.com/office/powerpoint/2010/main" val="1451764891"/>
       </p:ext>
     </p:extLst>
   </p:cSld>
@@ -4881,17 +6089,17 @@
           <a:p>
             <a:r>
               <a:rPr lang="en-US" sz="3600" dirty="0"/>
-              <a:t>Comparing Existing Questionnaires</a:t>
+              <a:t>Questionnaire to Improve Course</a:t>
             </a:r>
           </a:p>
         </p:txBody>
       </p:sp>
       <p:pic>
         <p:nvPicPr>
-          <p:cNvPr id="8" name="Picture 7">
-            <a:extLst>
-              <a:ext uri="{FF2B5EF4-FFF2-40B4-BE49-F238E27FC236}">
-                <a16:creationId xmlns:a16="http://schemas.microsoft.com/office/drawing/2014/main" id="{34A1A31E-7DF1-7229-20FE-5BE6D326683F}"/>
+          <p:cNvPr id="9" name="Picture 8">
+            <a:extLst>
+              <a:ext uri="{FF2B5EF4-FFF2-40B4-BE49-F238E27FC236}">
+                <a16:creationId xmlns:a16="http://schemas.microsoft.com/office/drawing/2014/main" id="{EEE7FE14-330D-7531-3881-5B547EEB1928}"/>
               </a:ext>
             </a:extLst>
           </p:cNvPr>
@@ -4901,45 +6109,21 @@
           <p:nvPr/>
         </p:nvPicPr>
         <p:blipFill>
-          <a:blip r:embed="rId3"/>
+          <a:blip r:embed="rId3">
+            <a:extLst>
+              <a:ext uri="{28A0092B-C50C-407E-A947-70E740481C1C}">
+                <a14:useLocalDpi xmlns:a14="http://schemas.microsoft.com/office/drawing/2010/main" val="0"/>
+              </a:ext>
+            </a:extLst>
+          </a:blip>
           <a:stretch>
             <a:fillRect/>
           </a:stretch>
         </p:blipFill>
         <p:spPr>
           <a:xfrm>
-            <a:off x="6052318" y="3242243"/>
-            <a:ext cx="6083567" cy="1525066"/>
-          </a:xfrm>
-          <a:prstGeom prst="rect">
-            <a:avLst/>
-          </a:prstGeom>
-        </p:spPr>
-      </p:pic>
-      <p:pic>
-        <p:nvPicPr>
-          <p:cNvPr id="6" name="Picture 5">
-            <a:extLst>
-              <a:ext uri="{FF2B5EF4-FFF2-40B4-BE49-F238E27FC236}">
-                <a16:creationId xmlns:a16="http://schemas.microsoft.com/office/drawing/2014/main" id="{5F41E630-98ED-C4B2-27CD-8408FCECB714}"/>
-              </a:ext>
-            </a:extLst>
-          </p:cNvPr>
-          <p:cNvPicPr>
-            <a:picLocks noChangeAspect="1"/>
-          </p:cNvPicPr>
-          <p:nvPr/>
-        </p:nvPicPr>
-        <p:blipFill>
-          <a:blip r:embed="rId4"/>
-          <a:stretch>
-            <a:fillRect/>
-          </a:stretch>
-        </p:blipFill>
-        <p:spPr>
-          <a:xfrm>
-            <a:off x="0" y="1819916"/>
-            <a:ext cx="6052318" cy="4953746"/>
+            <a:off x="4152900" y="1819962"/>
+            <a:ext cx="3886200" cy="5038038"/>
           </a:xfrm>
           <a:prstGeom prst="rect">
             <a:avLst/>
@@ -4949,7 +6133,7 @@
     </p:spTree>
     <p:extLst>
       <p:ext uri="{BB962C8B-B14F-4D97-AF65-F5344CB8AC3E}">
-        <p14:creationId xmlns:p14="http://schemas.microsoft.com/office/powerpoint/2010/main" val="3575687779"/>
+        <p14:creationId xmlns:p14="http://schemas.microsoft.com/office/powerpoint/2010/main" val="3025373490"/>
       </p:ext>
     </p:extLst>
   </p:cSld>
@@ -5036,17 +6220,17 @@
           <a:p>
             <a:r>
               <a:rPr lang="en-US" sz="3600" dirty="0"/>
-              <a:t>Retrospective Questionnaire Of BSDS Program</a:t>
+              <a:t>Comparing Existing Questionnaires</a:t>
             </a:r>
           </a:p>
         </p:txBody>
       </p:sp>
       <p:pic>
         <p:nvPicPr>
-          <p:cNvPr id="9" name="Picture 8">
-            <a:extLst>
-              <a:ext uri="{FF2B5EF4-FFF2-40B4-BE49-F238E27FC236}">
-                <a16:creationId xmlns:a16="http://schemas.microsoft.com/office/drawing/2014/main" id="{ADAF029F-2941-0FC2-988C-BD2A2E529093}"/>
+          <p:cNvPr id="8" name="Picture 7">
+            <a:extLst>
+              <a:ext uri="{FF2B5EF4-FFF2-40B4-BE49-F238E27FC236}">
+                <a16:creationId xmlns:a16="http://schemas.microsoft.com/office/drawing/2014/main" id="{34A1A31E-7DF1-7229-20FE-5BE6D326683F}"/>
               </a:ext>
             </a:extLst>
           </p:cNvPr>
@@ -5063,8 +6247,38 @@
         </p:blipFill>
         <p:spPr>
           <a:xfrm>
-            <a:off x="3220576" y="1819917"/>
-            <a:ext cx="5750847" cy="5038083"/>
+            <a:off x="6052318" y="3242243"/>
+            <a:ext cx="6083567" cy="1525066"/>
+          </a:xfrm>
+          <a:prstGeom prst="rect">
+            <a:avLst/>
+          </a:prstGeom>
+        </p:spPr>
+      </p:pic>
+      <p:pic>
+        <p:nvPicPr>
+          <p:cNvPr id="6" name="Picture 5">
+            <a:extLst>
+              <a:ext uri="{FF2B5EF4-FFF2-40B4-BE49-F238E27FC236}">
+                <a16:creationId xmlns:a16="http://schemas.microsoft.com/office/drawing/2014/main" id="{5F41E630-98ED-C4B2-27CD-8408FCECB714}"/>
+              </a:ext>
+            </a:extLst>
+          </p:cNvPr>
+          <p:cNvPicPr>
+            <a:picLocks noChangeAspect="1"/>
+          </p:cNvPicPr>
+          <p:nvPr/>
+        </p:nvPicPr>
+        <p:blipFill>
+          <a:blip r:embed="rId4"/>
+          <a:stretch>
+            <a:fillRect/>
+          </a:stretch>
+        </p:blipFill>
+        <p:spPr>
+          <a:xfrm>
+            <a:off x="0" y="1819916"/>
+            <a:ext cx="6052318" cy="4953746"/>
           </a:xfrm>
           <a:prstGeom prst="rect">
             <a:avLst/>
@@ -5074,7 +6288,7 @@
     </p:spTree>
     <p:extLst>
       <p:ext uri="{BB962C8B-B14F-4D97-AF65-F5344CB8AC3E}">
-        <p14:creationId xmlns:p14="http://schemas.microsoft.com/office/powerpoint/2010/main" val="1321702743"/>
+        <p14:creationId xmlns:p14="http://schemas.microsoft.com/office/powerpoint/2010/main" val="3575687779"/>
       </p:ext>
     </p:extLst>
   </p:cSld>
@@ -5161,7 +6375,7 @@
           <a:p>
             <a:r>
               <a:rPr lang="en-US" sz="3600" dirty="0"/>
-              <a:t>Deployment</a:t>
+              <a:t>Retrospective Questionnaire Of BSDS Program</a:t>
             </a:r>
           </a:p>
         </p:txBody>
@@ -5171,7 +6385,7 @@
           <p:cNvPr id="9" name="Picture 8">
             <a:extLst>
               <a:ext uri="{FF2B5EF4-FFF2-40B4-BE49-F238E27FC236}">
-                <a16:creationId xmlns:a16="http://schemas.microsoft.com/office/drawing/2014/main" id="{EEE7FE14-330D-7531-3881-5B547EEB1928}"/>
+                <a16:creationId xmlns:a16="http://schemas.microsoft.com/office/drawing/2014/main" id="{ADAF029F-2941-0FC2-988C-BD2A2E529093}"/>
               </a:ext>
             </a:extLst>
           </p:cNvPr>
@@ -5181,21 +6395,15 @@
           <p:nvPr/>
         </p:nvPicPr>
         <p:blipFill>
-          <a:blip r:embed="rId3">
-            <a:extLst>
-              <a:ext uri="{28A0092B-C50C-407E-A947-70E740481C1C}">
-                <a14:useLocalDpi xmlns:a14="http://schemas.microsoft.com/office/drawing/2010/main" val="0"/>
-              </a:ext>
-            </a:extLst>
-          </a:blip>
+          <a:blip r:embed="rId3"/>
           <a:stretch>
             <a:fillRect/>
           </a:stretch>
         </p:blipFill>
         <p:spPr>
           <a:xfrm>
-            <a:off x="4152900" y="1819962"/>
-            <a:ext cx="3886200" cy="5038038"/>
+            <a:off x="3220576" y="1819917"/>
+            <a:ext cx="5750847" cy="5038083"/>
           </a:xfrm>
           <a:prstGeom prst="rect">
             <a:avLst/>
@@ -5205,7 +6413,7 @@
     </p:spTree>
     <p:extLst>
       <p:ext uri="{BB962C8B-B14F-4D97-AF65-F5344CB8AC3E}">
-        <p14:creationId xmlns:p14="http://schemas.microsoft.com/office/powerpoint/2010/main" val="26722856"/>
+        <p14:creationId xmlns:p14="http://schemas.microsoft.com/office/powerpoint/2010/main" val="1321702743"/>
       </p:ext>
     </p:extLst>
   </p:cSld>

</xml_diff>